<commit_message>
Corrijo ppt y .ipynb
</commit_message>
<xml_diff>
--- a/Simulación de Peticiones.pptx
+++ b/Simulación de Peticiones.pptx
@@ -1239,7 +1239,7 @@
       </p:grpSpPr>
       <p:sp>
         <p:nvSpPr>
-          <p:cNvPr id="188" name="Google Shape;188;g3571912cbcd_1_26:notes"/>
+          <p:cNvPr id="188" name="Google Shape;188;g3571912cbcd_1_0:notes"/>
           <p:cNvSpPr/>
           <p:nvPr>
             <p:ph idx="2" type="sldImg"/>
@@ -1274,7 +1274,7 @@
       </p:sp>
       <p:sp>
         <p:nvSpPr>
-          <p:cNvPr id="189" name="Google Shape;189;g3571912cbcd_1_26:notes"/>
+          <p:cNvPr id="189" name="Google Shape;189;g3571912cbcd_1_0:notes"/>
           <p:cNvSpPr txBox="1"/>
           <p:nvPr>
             <p:ph idx="1" type="body"/>
@@ -1338,7 +1338,7 @@
       </p:grpSpPr>
       <p:sp>
         <p:nvSpPr>
-          <p:cNvPr id="197" name="Google Shape;197;g3571912cbcd_1_0:notes"/>
+          <p:cNvPr id="197" name="Google Shape;197;g3571912cbcd_1_26:notes"/>
           <p:cNvSpPr/>
           <p:nvPr>
             <p:ph idx="2" type="sldImg"/>
@@ -1373,7 +1373,7 @@
       </p:sp>
       <p:sp>
         <p:nvSpPr>
-          <p:cNvPr id="198" name="Google Shape;198;g3571912cbcd_1_0:notes"/>
+          <p:cNvPr id="198" name="Google Shape;198;g3571912cbcd_1_26:notes"/>
           <p:cNvSpPr txBox="1"/>
           <p:nvPr>
             <p:ph idx="1" type="body"/>
@@ -9664,7 +9664,7 @@
                 <a:cs typeface="Raleway"/>
                 <a:sym typeface="Raleway"/>
               </a:rPr>
-              <a:t> óptimo</a:t>
+              <a:t> intermedio</a:t>
             </a:r>
             <a:endParaRPr sz="1800">
               <a:solidFill>
@@ -9780,7 +9780,7 @@
                 <a:cs typeface="Raleway Medium"/>
                 <a:sym typeface="Raleway Medium"/>
               </a:rPr>
-              <a:t>Escenario intermedio</a:t>
+              <a:t>Escenario óptimo</a:t>
             </a:r>
             <a:endParaRPr sz="1800">
               <a:solidFill>
@@ -10694,8 +10694,8 @@
         </p:nvSpPr>
         <p:spPr>
           <a:xfrm>
-            <a:off x="2531800" y="1347500"/>
-            <a:ext cx="2678700" cy="535200"/>
+            <a:off x="2531800" y="1347488"/>
+            <a:ext cx="2266800" cy="535200"/>
           </a:xfrm>
           <a:prstGeom prst="rect">
             <a:avLst/>
@@ -10749,7 +10749,7 @@
       </p:sp>
       <p:pic>
         <p:nvPicPr>
-          <p:cNvPr id="193" name="Google Shape;193;p26" title="Captura de pantalla 2025-05-09 195825.png"/>
+          <p:cNvPr id="193" name="Google Shape;193;p26" title="Captura de pantalla 2025-05-09 194440.png"/>
           <p:cNvPicPr preferRelativeResize="0"/>
           <p:nvPr/>
         </p:nvPicPr>
@@ -10763,8 +10763,8 @@
         </p:blipFill>
         <p:spPr>
           <a:xfrm>
-            <a:off x="5507275" y="1347500"/>
-            <a:ext cx="3346475" cy="3723373"/>
+            <a:off x="152400" y="1938238"/>
+            <a:ext cx="4712224" cy="1267025"/>
           </a:xfrm>
           <a:prstGeom prst="rect">
             <a:avLst/>
@@ -10777,7 +10777,7 @@
       </p:pic>
       <p:pic>
         <p:nvPicPr>
-          <p:cNvPr id="194" name="Google Shape;194;p26" title="Captura de pantalla 2025-05-09 195818.png"/>
+          <p:cNvPr id="194" name="Google Shape;194;p26" title="Captura de pantalla 2025-05-09 194445.png"/>
           <p:cNvPicPr preferRelativeResize="0"/>
           <p:nvPr/>
         </p:nvPicPr>
@@ -10791,8 +10791,8 @@
         </p:blipFill>
         <p:spPr>
           <a:xfrm>
-            <a:off x="303500" y="3466100"/>
-            <a:ext cx="4988676" cy="1414907"/>
+            <a:off x="152400" y="3646325"/>
+            <a:ext cx="4712226" cy="1326450"/>
           </a:xfrm>
           <a:prstGeom prst="rect">
             <a:avLst/>
@@ -10805,22 +10805,21 @@
       </p:pic>
       <p:pic>
         <p:nvPicPr>
-          <p:cNvPr id="195" name="Google Shape;195;p26" title="Captura de pantalla 2025-05-09 195812.png"/>
+          <p:cNvPr id="195" name="Google Shape;195;p26" title="Captura de pantalla 2025-05-09 194842.png"/>
           <p:cNvPicPr preferRelativeResize="0"/>
           <p:nvPr/>
         </p:nvPicPr>
-        <p:blipFill>
+        <p:blipFill rotWithShape="1">
           <a:blip r:embed="rId5">
             <a:alphaModFix/>
           </a:blip>
-          <a:stretch>
-            <a:fillRect/>
-          </a:stretch>
+          <a:srcRect b="5490" l="0" r="0" t="0"/>
+          <a:stretch/>
         </p:blipFill>
         <p:spPr>
           <a:xfrm>
-            <a:off x="328151" y="2015250"/>
-            <a:ext cx="4939376" cy="1171125"/>
+            <a:off x="5026225" y="1462425"/>
+            <a:ext cx="3892200" cy="3510350"/>
           </a:xfrm>
           <a:prstGeom prst="rect">
             <a:avLst/>
@@ -10919,8 +10918,8 @@
         </p:nvSpPr>
         <p:spPr>
           <a:xfrm>
-            <a:off x="2531800" y="1347488"/>
-            <a:ext cx="2266800" cy="535200"/>
+            <a:off x="2531800" y="1347500"/>
+            <a:ext cx="2678700" cy="535200"/>
           </a:xfrm>
           <a:prstGeom prst="rect">
             <a:avLst/>
@@ -10970,11 +10969,37 @@
               <a:sym typeface="Raleway"/>
             </a:endParaRPr>
           </a:p>
+          <a:p>
+            <a:pPr indent="0" lvl="0" marL="0" marR="0" rtl="0" algn="l">
+              <a:lnSpc>
+                <a:spcPct val="100000"/>
+              </a:lnSpc>
+              <a:spcBef>
+                <a:spcPts val="0"/>
+              </a:spcBef>
+              <a:spcAft>
+                <a:spcPts val="0"/>
+              </a:spcAft>
+              <a:buNone/>
+            </a:pPr>
+            <a:r>
+              <a:t/>
+            </a:r>
+            <a:endParaRPr sz="1900">
+              <a:solidFill>
+                <a:schemeClr val="dk2"/>
+              </a:solidFill>
+              <a:latin typeface="Raleway"/>
+              <a:ea typeface="Raleway"/>
+              <a:cs typeface="Raleway"/>
+              <a:sym typeface="Raleway"/>
+            </a:endParaRPr>
+          </a:p>
         </p:txBody>
       </p:sp>
       <p:pic>
         <p:nvPicPr>
-          <p:cNvPr id="202" name="Google Shape;202;p27" title="Captura de pantalla 2025-05-09 194440.png"/>
+          <p:cNvPr id="202" name="Google Shape;202;p27" title="Captura de pantalla 2025-05-09 195825.png"/>
           <p:cNvPicPr preferRelativeResize="0"/>
           <p:nvPr/>
         </p:nvPicPr>
@@ -10988,8 +11013,8 @@
         </p:blipFill>
         <p:spPr>
           <a:xfrm>
-            <a:off x="152400" y="1938238"/>
-            <a:ext cx="4712224" cy="1267025"/>
+            <a:off x="5507275" y="1347500"/>
+            <a:ext cx="3346475" cy="3723373"/>
           </a:xfrm>
           <a:prstGeom prst="rect">
             <a:avLst/>
@@ -11002,7 +11027,7 @@
       </p:pic>
       <p:pic>
         <p:nvPicPr>
-          <p:cNvPr id="203" name="Google Shape;203;p27" title="Captura de pantalla 2025-05-09 194445.png"/>
+          <p:cNvPr id="203" name="Google Shape;203;p27" title="Captura de pantalla 2025-05-09 195818.png"/>
           <p:cNvPicPr preferRelativeResize="0"/>
           <p:nvPr/>
         </p:nvPicPr>
@@ -11016,8 +11041,8 @@
         </p:blipFill>
         <p:spPr>
           <a:xfrm>
-            <a:off x="152400" y="3646325"/>
-            <a:ext cx="4712226" cy="1326450"/>
+            <a:off x="303500" y="3466100"/>
+            <a:ext cx="4988676" cy="1414907"/>
           </a:xfrm>
           <a:prstGeom prst="rect">
             <a:avLst/>
@@ -11030,21 +11055,22 @@
       </p:pic>
       <p:pic>
         <p:nvPicPr>
-          <p:cNvPr id="204" name="Google Shape;204;p27" title="Captura de pantalla 2025-05-09 194842.png"/>
+          <p:cNvPr id="204" name="Google Shape;204;p27" title="Captura de pantalla 2025-05-09 195812.png"/>
           <p:cNvPicPr preferRelativeResize="0"/>
           <p:nvPr/>
         </p:nvPicPr>
-        <p:blipFill rotWithShape="1">
+        <p:blipFill>
           <a:blip r:embed="rId5">
             <a:alphaModFix/>
           </a:blip>
-          <a:srcRect b="5490" l="0" r="0" t="0"/>
-          <a:stretch/>
+          <a:stretch>
+            <a:fillRect/>
+          </a:stretch>
         </p:blipFill>
         <p:spPr>
           <a:xfrm>
-            <a:off x="5026225" y="1462425"/>
-            <a:ext cx="3892200" cy="3510350"/>
+            <a:off x="328151" y="2015250"/>
+            <a:ext cx="4939376" cy="1171125"/>
           </a:xfrm>
           <a:prstGeom prst="rect">
             <a:avLst/>
@@ -12138,7 +12164,7 @@
             <a:tbl>
               <a:tblPr>
                 <a:noFill/>
-                <a:tableStyleId>{B9025CC8-620C-4C69-B8CC-FBBE81ADCBA9}</a:tableStyleId>
+                <a:tableStyleId>{B27A61A2-D777-4C85-A653-30AD4423CE85}</a:tableStyleId>
               </a:tblPr>
               <a:tblGrid>
                 <a:gridCol w="1809750"/>

</xml_diff>